<commit_message>
update to header to remove unused link and dist
</commit_message>
<xml_diff>
--- a/proj3.pptx
+++ b/proj3.pptx
@@ -106,6 +106,11 @@
       </a:defRPr>
     </a:lvl9pPr>
   </p:defaultTextStyle>
+  <p:extLst>
+    <p:ext uri="{EFAFB233-063F-42B5-8137-9DF3F51BA10A}">
+      <p15:sldGuideLst xmlns:p15="http://schemas.microsoft.com/office/powerpoint/2012/main"/>
+    </p:ext>
+  </p:extLst>
 </p:presentation>
 </file>
 
@@ -166,7 +171,7 @@
           <a:noFill/>
           <a:extLst>
             <a:ext uri="{909E8E84-426E-40dd-AFC4-6F175D3DCCD1}">
-              <a14:hiddenFill xmlns:a14="http://schemas.microsoft.com/office/drawing/2010/main" xmlns="">
+              <a14:hiddenFill xmlns="" xmlns:a14="http://schemas.microsoft.com/office/drawing/2010/main">
                 <a:solidFill>
                   <a:srgbClr val="FFFFFF"/>
                 </a:solidFill>
@@ -225,7 +230,7 @@
             </a:ln>
             <a:extLst>
               <a:ext uri="{91240B29-F687-4f45-9708-019B960494DF}">
-                <a14:hiddenLine xmlns:a14="http://schemas.microsoft.com/office/drawing/2010/main" xmlns="" w="9525">
+                <a14:hiddenLine xmlns="" xmlns:a14="http://schemas.microsoft.com/office/drawing/2010/main" w="9525">
                   <a:solidFill>
                     <a:srgbClr val="000000"/>
                   </a:solidFill>
@@ -315,7 +320,7 @@
             </a:ln>
             <a:extLst>
               <a:ext uri="{91240B29-F687-4f45-9708-019B960494DF}">
-                <a14:hiddenLine xmlns:a14="http://schemas.microsoft.com/office/drawing/2010/main" xmlns="" w="9525">
+                <a14:hiddenLine xmlns="" xmlns:a14="http://schemas.microsoft.com/office/drawing/2010/main" w="9525">
                   <a:solidFill>
                     <a:srgbClr val="000000"/>
                   </a:solidFill>
@@ -405,7 +410,7 @@
             </a:ln>
             <a:extLst>
               <a:ext uri="{91240B29-F687-4f45-9708-019B960494DF}">
-                <a14:hiddenLine xmlns:a14="http://schemas.microsoft.com/office/drawing/2010/main" xmlns="" w="9525">
+                <a14:hiddenLine xmlns="" xmlns:a14="http://schemas.microsoft.com/office/drawing/2010/main" w="9525">
                   <a:solidFill>
                     <a:srgbClr val="000000"/>
                   </a:solidFill>
@@ -439,7 +444,7 @@
             </a:ln>
             <a:extLst>
               <a:ext uri="{91240B29-F687-4f45-9708-019B960494DF}">
-                <a14:hiddenLine xmlns:a14="http://schemas.microsoft.com/office/drawing/2010/main" xmlns="" w="9525">
+                <a14:hiddenLine xmlns="" xmlns:a14="http://schemas.microsoft.com/office/drawing/2010/main" w="9525">
                   <a:solidFill>
                     <a:srgbClr val="000000"/>
                   </a:solidFill>
@@ -529,7 +534,7 @@
             </a:ln>
             <a:extLst>
               <a:ext uri="{91240B29-F687-4f45-9708-019B960494DF}">
-                <a14:hiddenLine xmlns:a14="http://schemas.microsoft.com/office/drawing/2010/main" xmlns="" w="9525">
+                <a14:hiddenLine xmlns="" xmlns:a14="http://schemas.microsoft.com/office/drawing/2010/main" w="9525">
                   <a:solidFill>
                     <a:srgbClr val="000000"/>
                   </a:solidFill>
@@ -591,7 +596,7 @@
             </a:ln>
             <a:extLst>
               <a:ext uri="{91240B29-F687-4f45-9708-019B960494DF}">
-                <a14:hiddenLine xmlns:a14="http://schemas.microsoft.com/office/drawing/2010/main" xmlns="" w="9525">
+                <a14:hiddenLine xmlns="" xmlns:a14="http://schemas.microsoft.com/office/drawing/2010/main" w="9525">
                   <a:solidFill>
                     <a:srgbClr val="000000"/>
                   </a:solidFill>
@@ -653,7 +658,7 @@
             </a:ln>
             <a:extLst>
               <a:ext uri="{91240B29-F687-4f45-9708-019B960494DF}">
-                <a14:hiddenLine xmlns:a14="http://schemas.microsoft.com/office/drawing/2010/main" xmlns="" w="9525">
+                <a14:hiddenLine xmlns="" xmlns:a14="http://schemas.microsoft.com/office/drawing/2010/main" w="9525">
                   <a:solidFill>
                     <a:srgbClr val="000000"/>
                   </a:solidFill>
@@ -743,7 +748,7 @@
             </a:ln>
             <a:extLst>
               <a:ext uri="{91240B29-F687-4f45-9708-019B960494DF}">
-                <a14:hiddenLine xmlns:a14="http://schemas.microsoft.com/office/drawing/2010/main" xmlns="" w="9525">
+                <a14:hiddenLine xmlns="" xmlns:a14="http://schemas.microsoft.com/office/drawing/2010/main" w="9525">
                   <a:solidFill>
                     <a:srgbClr val="000000"/>
                   </a:solidFill>
@@ -805,7 +810,7 @@
             </a:ln>
             <a:extLst>
               <a:ext uri="{91240B29-F687-4f45-9708-019B960494DF}">
-                <a14:hiddenLine xmlns:a14="http://schemas.microsoft.com/office/drawing/2010/main" xmlns="" w="9525">
+                <a14:hiddenLine xmlns="" xmlns:a14="http://schemas.microsoft.com/office/drawing/2010/main" w="9525">
                   <a:solidFill>
                     <a:srgbClr val="000000"/>
                   </a:solidFill>
@@ -867,7 +872,7 @@
             </a:ln>
             <a:extLst>
               <a:ext uri="{91240B29-F687-4f45-9708-019B960494DF}">
-                <a14:hiddenLine xmlns:a14="http://schemas.microsoft.com/office/drawing/2010/main" xmlns="" w="9525">
+                <a14:hiddenLine xmlns="" xmlns:a14="http://schemas.microsoft.com/office/drawing/2010/main" w="9525">
                   <a:solidFill>
                     <a:srgbClr val="000000"/>
                   </a:solidFill>
@@ -957,7 +962,7 @@
             </a:ln>
             <a:extLst>
               <a:ext uri="{91240B29-F687-4f45-9708-019B960494DF}">
-                <a14:hiddenLine xmlns:a14="http://schemas.microsoft.com/office/drawing/2010/main" xmlns="" w="9525">
+                <a14:hiddenLine xmlns="" xmlns:a14="http://schemas.microsoft.com/office/drawing/2010/main" w="9525">
                   <a:solidFill>
                     <a:srgbClr val="000000"/>
                   </a:solidFill>
@@ -1047,7 +1052,7 @@
             </a:ln>
             <a:extLst>
               <a:ext uri="{91240B29-F687-4f45-9708-019B960494DF}">
-                <a14:hiddenLine xmlns:a14="http://schemas.microsoft.com/office/drawing/2010/main" xmlns="" w="9525">
+                <a14:hiddenLine xmlns="" xmlns:a14="http://schemas.microsoft.com/office/drawing/2010/main" w="9525">
                   <a:solidFill>
                     <a:srgbClr val="000000"/>
                   </a:solidFill>
@@ -1109,7 +1114,7 @@
             </a:ln>
             <a:extLst>
               <a:ext uri="{91240B29-F687-4f45-9708-019B960494DF}">
-                <a14:hiddenLine xmlns:a14="http://schemas.microsoft.com/office/drawing/2010/main" xmlns="" w="9525">
+                <a14:hiddenLine xmlns="" xmlns:a14="http://schemas.microsoft.com/office/drawing/2010/main" w="9525">
                   <a:solidFill>
                     <a:srgbClr val="000000"/>
                   </a:solidFill>
@@ -1219,7 +1224,7 @@
             </a:ln>
             <a:extLst>
               <a:ext uri="{91240B29-F687-4f45-9708-019B960494DF}">
-                <a14:hiddenLine xmlns:a14="http://schemas.microsoft.com/office/drawing/2010/main" xmlns="" w="9525">
+                <a14:hiddenLine xmlns="" xmlns:a14="http://schemas.microsoft.com/office/drawing/2010/main" w="9525">
                   <a:solidFill>
                     <a:srgbClr val="000000"/>
                   </a:solidFill>
@@ -1281,7 +1286,7 @@
             </a:ln>
             <a:extLst>
               <a:ext uri="{91240B29-F687-4f45-9708-019B960494DF}">
-                <a14:hiddenLine xmlns:a14="http://schemas.microsoft.com/office/drawing/2010/main" xmlns="" w="9525">
+                <a14:hiddenLine xmlns="" xmlns:a14="http://schemas.microsoft.com/office/drawing/2010/main" w="9525">
                   <a:solidFill>
                     <a:srgbClr val="000000"/>
                   </a:solidFill>
@@ -1371,7 +1376,7 @@
             </a:ln>
             <a:extLst>
               <a:ext uri="{91240B29-F687-4f45-9708-019B960494DF}">
-                <a14:hiddenLine xmlns:a14="http://schemas.microsoft.com/office/drawing/2010/main" xmlns="" w="9525">
+                <a14:hiddenLine xmlns="" xmlns:a14="http://schemas.microsoft.com/office/drawing/2010/main" w="9525">
                   <a:solidFill>
                     <a:srgbClr val="000000"/>
                   </a:solidFill>
@@ -1461,7 +1466,7 @@
             </a:ln>
             <a:extLst>
               <a:ext uri="{91240B29-F687-4f45-9708-019B960494DF}">
-                <a14:hiddenLine xmlns:a14="http://schemas.microsoft.com/office/drawing/2010/main" xmlns="" w="9525">
+                <a14:hiddenLine xmlns="" xmlns:a14="http://schemas.microsoft.com/office/drawing/2010/main" w="9525">
                   <a:solidFill>
                     <a:srgbClr val="000000"/>
                   </a:solidFill>
@@ -1523,7 +1528,7 @@
             </a:ln>
             <a:extLst>
               <a:ext uri="{91240B29-F687-4f45-9708-019B960494DF}">
-                <a14:hiddenLine xmlns:a14="http://schemas.microsoft.com/office/drawing/2010/main" xmlns="" w="9525">
+                <a14:hiddenLine xmlns="" xmlns:a14="http://schemas.microsoft.com/office/drawing/2010/main" w="9525">
                   <a:solidFill>
                     <a:srgbClr val="000000"/>
                   </a:solidFill>
@@ -1613,7 +1618,7 @@
             </a:ln>
             <a:extLst>
               <a:ext uri="{91240B29-F687-4f45-9708-019B960494DF}">
-                <a14:hiddenLine xmlns:a14="http://schemas.microsoft.com/office/drawing/2010/main" xmlns="" w="9525">
+                <a14:hiddenLine xmlns="" xmlns:a14="http://schemas.microsoft.com/office/drawing/2010/main" w="9525">
                   <a:solidFill>
                     <a:srgbClr val="000000"/>
                   </a:solidFill>
@@ -1703,7 +1708,7 @@
             </a:ln>
             <a:extLst>
               <a:ext uri="{91240B29-F687-4f45-9708-019B960494DF}">
-                <a14:hiddenLine xmlns:a14="http://schemas.microsoft.com/office/drawing/2010/main" xmlns="" w="9525">
+                <a14:hiddenLine xmlns="" xmlns:a14="http://schemas.microsoft.com/office/drawing/2010/main" w="9525">
                   <a:solidFill>
                     <a:srgbClr val="000000"/>
                   </a:solidFill>
@@ -1759,7 +1764,7 @@
             </a:ln>
             <a:extLst>
               <a:ext uri="{91240B29-F687-4f45-9708-019B960494DF}">
-                <a14:hiddenLine xmlns:a14="http://schemas.microsoft.com/office/drawing/2010/main" xmlns="" w="9525">
+                <a14:hiddenLine xmlns="" xmlns:a14="http://schemas.microsoft.com/office/drawing/2010/main" w="9525">
                   <a:solidFill>
                     <a:srgbClr val="000000"/>
                   </a:solidFill>
@@ -1849,7 +1854,7 @@
             </a:ln>
             <a:extLst>
               <a:ext uri="{91240B29-F687-4f45-9708-019B960494DF}">
-                <a14:hiddenLine xmlns:a14="http://schemas.microsoft.com/office/drawing/2010/main" xmlns="" w="9525">
+                <a14:hiddenLine xmlns="" xmlns:a14="http://schemas.microsoft.com/office/drawing/2010/main" w="9525">
                   <a:solidFill>
                     <a:srgbClr val="000000"/>
                   </a:solidFill>
@@ -1905,7 +1910,7 @@
             </a:ln>
             <a:extLst>
               <a:ext uri="{91240B29-F687-4f45-9708-019B960494DF}">
-                <a14:hiddenLine xmlns:a14="http://schemas.microsoft.com/office/drawing/2010/main" xmlns="" w="9525">
+                <a14:hiddenLine xmlns="" xmlns:a14="http://schemas.microsoft.com/office/drawing/2010/main" w="9525">
                   <a:solidFill>
                     <a:srgbClr val="000000"/>
                   </a:solidFill>
@@ -1995,7 +2000,7 @@
             </a:ln>
             <a:extLst>
               <a:ext uri="{91240B29-F687-4f45-9708-019B960494DF}">
-                <a14:hiddenLine xmlns:a14="http://schemas.microsoft.com/office/drawing/2010/main" xmlns="" w="9525">
+                <a14:hiddenLine xmlns="" xmlns:a14="http://schemas.microsoft.com/office/drawing/2010/main" w="9525">
                   <a:solidFill>
                     <a:srgbClr val="000000"/>
                   </a:solidFill>
@@ -2063,7 +2068,7 @@
             </a:ln>
             <a:extLst>
               <a:ext uri="{91240B29-F687-4f45-9708-019B960494DF}">
-                <a14:hiddenLine xmlns:a14="http://schemas.microsoft.com/office/drawing/2010/main" xmlns="" w="9525">
+                <a14:hiddenLine xmlns="" xmlns:a14="http://schemas.microsoft.com/office/drawing/2010/main" w="9525">
                   <a:solidFill>
                     <a:srgbClr val="000000"/>
                   </a:solidFill>
@@ -2153,7 +2158,7 @@
             </a:ln>
             <a:extLst>
               <a:ext uri="{91240B29-F687-4f45-9708-019B960494DF}">
-                <a14:hiddenLine xmlns:a14="http://schemas.microsoft.com/office/drawing/2010/main" xmlns="" w="9525">
+                <a14:hiddenLine xmlns="" xmlns:a14="http://schemas.microsoft.com/office/drawing/2010/main" w="9525">
                   <a:solidFill>
                     <a:srgbClr val="000000"/>
                   </a:solidFill>
@@ -2221,7 +2226,7 @@
             </a:ln>
             <a:extLst>
               <a:ext uri="{91240B29-F687-4f45-9708-019B960494DF}">
-                <a14:hiddenLine xmlns:a14="http://schemas.microsoft.com/office/drawing/2010/main" xmlns="" w="9525">
+                <a14:hiddenLine xmlns="" xmlns:a14="http://schemas.microsoft.com/office/drawing/2010/main" w="9525">
                   <a:solidFill>
                     <a:srgbClr val="000000"/>
                   </a:solidFill>
@@ -2311,7 +2316,7 @@
             </a:ln>
             <a:extLst>
               <a:ext uri="{91240B29-F687-4f45-9708-019B960494DF}">
-                <a14:hiddenLine xmlns:a14="http://schemas.microsoft.com/office/drawing/2010/main" xmlns="" w="9525">
+                <a14:hiddenLine xmlns="" xmlns:a14="http://schemas.microsoft.com/office/drawing/2010/main" w="9525">
                   <a:solidFill>
                     <a:srgbClr val="000000"/>
                   </a:solidFill>
@@ -2345,7 +2350,7 @@
             </a:ln>
             <a:extLst>
               <a:ext uri="{91240B29-F687-4f45-9708-019B960494DF}">
-                <a14:hiddenLine xmlns:a14="http://schemas.microsoft.com/office/drawing/2010/main" xmlns="" w="9525">
+                <a14:hiddenLine xmlns="" xmlns:a14="http://schemas.microsoft.com/office/drawing/2010/main" w="9525">
                   <a:solidFill>
                     <a:srgbClr val="000000"/>
                   </a:solidFill>
@@ -2435,7 +2440,7 @@
             </a:ln>
             <a:extLst>
               <a:ext uri="{91240B29-F687-4f45-9708-019B960494DF}">
-                <a14:hiddenLine xmlns:a14="http://schemas.microsoft.com/office/drawing/2010/main" xmlns="" w="9525">
+                <a14:hiddenLine xmlns="" xmlns:a14="http://schemas.microsoft.com/office/drawing/2010/main" w="9525">
                   <a:solidFill>
                     <a:srgbClr val="000000"/>
                   </a:solidFill>
@@ -2497,7 +2502,7 @@
             </a:ln>
             <a:extLst>
               <a:ext uri="{91240B29-F687-4f45-9708-019B960494DF}">
-                <a14:hiddenLine xmlns:a14="http://schemas.microsoft.com/office/drawing/2010/main" xmlns="" w="9525">
+                <a14:hiddenLine xmlns="" xmlns:a14="http://schemas.microsoft.com/office/drawing/2010/main" w="9525">
                   <a:solidFill>
                     <a:srgbClr val="000000"/>
                   </a:solidFill>
@@ -2559,7 +2564,7 @@
             </a:ln>
             <a:extLst>
               <a:ext uri="{91240B29-F687-4f45-9708-019B960494DF}">
-                <a14:hiddenLine xmlns:a14="http://schemas.microsoft.com/office/drawing/2010/main" xmlns="" w="9525">
+                <a14:hiddenLine xmlns="" xmlns:a14="http://schemas.microsoft.com/office/drawing/2010/main" w="9525">
                   <a:solidFill>
                     <a:srgbClr val="000000"/>
                   </a:solidFill>
@@ -2649,7 +2654,7 @@
             </a:ln>
             <a:extLst>
               <a:ext uri="{91240B29-F687-4f45-9708-019B960494DF}">
-                <a14:hiddenLine xmlns:a14="http://schemas.microsoft.com/office/drawing/2010/main" xmlns="" w="9525">
+                <a14:hiddenLine xmlns="" xmlns:a14="http://schemas.microsoft.com/office/drawing/2010/main" w="9525">
                   <a:solidFill>
                     <a:srgbClr val="000000"/>
                   </a:solidFill>
@@ -2717,7 +2722,7 @@
             </a:ln>
             <a:extLst>
               <a:ext uri="{91240B29-F687-4f45-9708-019B960494DF}">
-                <a14:hiddenLine xmlns:a14="http://schemas.microsoft.com/office/drawing/2010/main" xmlns="" w="9525">
+                <a14:hiddenLine xmlns="" xmlns:a14="http://schemas.microsoft.com/office/drawing/2010/main" w="9525">
                   <a:solidFill>
                     <a:srgbClr val="000000"/>
                   </a:solidFill>
@@ -2779,7 +2784,7 @@
             </a:ln>
             <a:extLst>
               <a:ext uri="{91240B29-F687-4f45-9708-019B960494DF}">
-                <a14:hiddenLine xmlns:a14="http://schemas.microsoft.com/office/drawing/2010/main" xmlns="" w="9525">
+                <a14:hiddenLine xmlns="" xmlns:a14="http://schemas.microsoft.com/office/drawing/2010/main" w="9525">
                   <a:solidFill>
                     <a:srgbClr val="000000"/>
                   </a:solidFill>
@@ -2869,7 +2874,7 @@
             </a:ln>
             <a:extLst>
               <a:ext uri="{91240B29-F687-4f45-9708-019B960494DF}">
-                <a14:hiddenLine xmlns:a14="http://schemas.microsoft.com/office/drawing/2010/main" xmlns="" w="9525">
+                <a14:hiddenLine xmlns="" xmlns:a14="http://schemas.microsoft.com/office/drawing/2010/main" w="9525">
                   <a:solidFill>
                     <a:srgbClr val="000000"/>
                   </a:solidFill>
@@ -2931,7 +2936,7 @@
             </a:ln>
             <a:extLst>
               <a:ext uri="{91240B29-F687-4f45-9708-019B960494DF}">
-                <a14:hiddenLine xmlns:a14="http://schemas.microsoft.com/office/drawing/2010/main" xmlns="" w="9525">
+                <a14:hiddenLine xmlns="" xmlns:a14="http://schemas.microsoft.com/office/drawing/2010/main" w="9525">
                   <a:solidFill>
                     <a:srgbClr val="000000"/>
                   </a:solidFill>
@@ -3021,7 +3026,7 @@
             </a:ln>
             <a:extLst>
               <a:ext uri="{91240B29-F687-4f45-9708-019B960494DF}">
-                <a14:hiddenLine xmlns:a14="http://schemas.microsoft.com/office/drawing/2010/main" xmlns="" w="9525">
+                <a14:hiddenLine xmlns="" xmlns:a14="http://schemas.microsoft.com/office/drawing/2010/main" w="9525">
                   <a:solidFill>
                     <a:srgbClr val="000000"/>
                   </a:solidFill>
@@ -3083,7 +3088,7 @@
             </a:ln>
             <a:extLst>
               <a:ext uri="{91240B29-F687-4f45-9708-019B960494DF}">
-                <a14:hiddenLine xmlns:a14="http://schemas.microsoft.com/office/drawing/2010/main" xmlns="" w="9525">
+                <a14:hiddenLine xmlns="" xmlns:a14="http://schemas.microsoft.com/office/drawing/2010/main" w="9525">
                   <a:solidFill>
                     <a:srgbClr val="000000"/>
                   </a:solidFill>
@@ -3173,7 +3178,7 @@
             </a:ln>
             <a:extLst>
               <a:ext uri="{91240B29-F687-4f45-9708-019B960494DF}">
-                <a14:hiddenLine xmlns:a14="http://schemas.microsoft.com/office/drawing/2010/main" xmlns="" w="9525">
+                <a14:hiddenLine xmlns="" xmlns:a14="http://schemas.microsoft.com/office/drawing/2010/main" w="9525">
                   <a:solidFill>
                     <a:srgbClr val="000000"/>
                   </a:solidFill>
@@ -3207,7 +3212,7 @@
             </a:ln>
             <a:extLst>
               <a:ext uri="{91240B29-F687-4f45-9708-019B960494DF}">
-                <a14:hiddenLine xmlns:a14="http://schemas.microsoft.com/office/drawing/2010/main" xmlns="" w="9525">
+                <a14:hiddenLine xmlns="" xmlns:a14="http://schemas.microsoft.com/office/drawing/2010/main" w="9525">
                   <a:solidFill>
                     <a:srgbClr val="000000"/>
                   </a:solidFill>
@@ -3272,7 +3277,7 @@
             </a:ln>
             <a:extLst>
               <a:ext uri="{91240B29-F687-4f45-9708-019B960494DF}">
-                <a14:hiddenLine xmlns:a14="http://schemas.microsoft.com/office/drawing/2010/main" xmlns="" w="9525">
+                <a14:hiddenLine xmlns="" xmlns:a14="http://schemas.microsoft.com/office/drawing/2010/main" w="9525">
                   <a:solidFill>
                     <a:srgbClr val="000000"/>
                   </a:solidFill>
@@ -3362,7 +3367,7 @@
             </a:ln>
             <a:extLst>
               <a:ext uri="{91240B29-F687-4f45-9708-019B960494DF}">
-                <a14:hiddenLine xmlns:a14="http://schemas.microsoft.com/office/drawing/2010/main" xmlns="" w="9525">
+                <a14:hiddenLine xmlns="" xmlns:a14="http://schemas.microsoft.com/office/drawing/2010/main" w="9525">
                   <a:solidFill>
                     <a:srgbClr val="000000"/>
                   </a:solidFill>
@@ -3424,7 +3429,7 @@
             </a:ln>
             <a:extLst>
               <a:ext uri="{91240B29-F687-4f45-9708-019B960494DF}">
-                <a14:hiddenLine xmlns:a14="http://schemas.microsoft.com/office/drawing/2010/main" xmlns="" w="9525">
+                <a14:hiddenLine xmlns="" xmlns:a14="http://schemas.microsoft.com/office/drawing/2010/main" w="9525">
                   <a:solidFill>
                     <a:srgbClr val="000000"/>
                   </a:solidFill>
@@ -3514,7 +3519,7 @@
             </a:ln>
             <a:extLst>
               <a:ext uri="{91240B29-F687-4f45-9708-019B960494DF}">
-                <a14:hiddenLine xmlns:a14="http://schemas.microsoft.com/office/drawing/2010/main" xmlns="" w="9525">
+                <a14:hiddenLine xmlns="" xmlns:a14="http://schemas.microsoft.com/office/drawing/2010/main" w="9525">
                   <a:solidFill>
                     <a:srgbClr val="000000"/>
                   </a:solidFill>
@@ -3604,7 +3609,7 @@
             </a:ln>
             <a:extLst>
               <a:ext uri="{91240B29-F687-4f45-9708-019B960494DF}">
-                <a14:hiddenLine xmlns:a14="http://schemas.microsoft.com/office/drawing/2010/main" xmlns="" w="9525">
+                <a14:hiddenLine xmlns="" xmlns:a14="http://schemas.microsoft.com/office/drawing/2010/main" w="9525">
                   <a:solidFill>
                     <a:srgbClr val="000000"/>
                   </a:solidFill>
@@ -3669,7 +3674,7 @@
             </a:ln>
             <a:extLst>
               <a:ext uri="{91240B29-F687-4f45-9708-019B960494DF}">
-                <a14:hiddenLine xmlns:a14="http://schemas.microsoft.com/office/drawing/2010/main" xmlns="" w="9525">
+                <a14:hiddenLine xmlns="" xmlns:a14="http://schemas.microsoft.com/office/drawing/2010/main" w="9525">
                   <a:solidFill>
                     <a:srgbClr val="000000"/>
                   </a:solidFill>
@@ -3731,7 +3736,7 @@
             </a:ln>
             <a:extLst>
               <a:ext uri="{91240B29-F687-4f45-9708-019B960494DF}">
-                <a14:hiddenLine xmlns:a14="http://schemas.microsoft.com/office/drawing/2010/main" xmlns="" w="9525">
+                <a14:hiddenLine xmlns="" xmlns:a14="http://schemas.microsoft.com/office/drawing/2010/main" w="9525">
                   <a:solidFill>
                     <a:srgbClr val="000000"/>
                   </a:solidFill>
@@ -3821,7 +3826,7 @@
             </a:ln>
             <a:extLst>
               <a:ext uri="{91240B29-F687-4f45-9708-019B960494DF}">
-                <a14:hiddenLine xmlns:a14="http://schemas.microsoft.com/office/drawing/2010/main" xmlns="" w="9525">
+                <a14:hiddenLine xmlns="" xmlns:a14="http://schemas.microsoft.com/office/drawing/2010/main" w="9525">
                   <a:solidFill>
                     <a:srgbClr val="000000"/>
                   </a:solidFill>
@@ -3911,7 +3916,7 @@
             </a:ln>
             <a:extLst>
               <a:ext uri="{91240B29-F687-4f45-9708-019B960494DF}">
-                <a14:hiddenLine xmlns:a14="http://schemas.microsoft.com/office/drawing/2010/main" xmlns="" w="9525">
+                <a14:hiddenLine xmlns="" xmlns:a14="http://schemas.microsoft.com/office/drawing/2010/main" w="9525">
                   <a:solidFill>
                     <a:srgbClr val="000000"/>
                   </a:solidFill>
@@ -3973,7 +3978,7 @@
             </a:ln>
             <a:extLst>
               <a:ext uri="{91240B29-F687-4f45-9708-019B960494DF}">
-                <a14:hiddenLine xmlns:a14="http://schemas.microsoft.com/office/drawing/2010/main" xmlns="" w="9525">
+                <a14:hiddenLine xmlns="" xmlns:a14="http://schemas.microsoft.com/office/drawing/2010/main" w="9525">
                   <a:solidFill>
                     <a:srgbClr val="000000"/>
                   </a:solidFill>
@@ -4093,7 +4098,7 @@
             </a:ln>
             <a:extLst>
               <a:ext uri="{91240B29-F687-4f45-9708-019B960494DF}">
-                <a14:hiddenLine xmlns:a14="http://schemas.microsoft.com/office/drawing/2010/main" xmlns="" w="9525">
+                <a14:hiddenLine xmlns="" xmlns:a14="http://schemas.microsoft.com/office/drawing/2010/main" w="9525">
                   <a:solidFill>
                     <a:srgbClr val="000000"/>
                   </a:solidFill>
@@ -4161,7 +4166,7 @@
             </a:ln>
             <a:extLst>
               <a:ext uri="{91240B29-F687-4f45-9708-019B960494DF}">
-                <a14:hiddenLine xmlns:a14="http://schemas.microsoft.com/office/drawing/2010/main" xmlns="" w="9525">
+                <a14:hiddenLine xmlns="" xmlns:a14="http://schemas.microsoft.com/office/drawing/2010/main" w="9525">
                   <a:solidFill>
                     <a:srgbClr val="000000"/>
                   </a:solidFill>
@@ -4251,7 +4256,7 @@
             </a:ln>
             <a:extLst>
               <a:ext uri="{91240B29-F687-4f45-9708-019B960494DF}">
-                <a14:hiddenLine xmlns:a14="http://schemas.microsoft.com/office/drawing/2010/main" xmlns="" w="9525">
+                <a14:hiddenLine xmlns="" xmlns:a14="http://schemas.microsoft.com/office/drawing/2010/main" w="9525">
                   <a:solidFill>
                     <a:srgbClr val="000000"/>
                   </a:solidFill>
@@ -4391,7 +4396,7 @@
           <a:p>
             <a:fld id="{48A87A34-81AB-432B-8DAE-1953F412C126}" type="datetimeFigureOut">
               <a:rPr lang="en-US" dirty="0"/>
-              <a:t>4/27/2018</a:t>
+              <a:t>4/28/2018</a:t>
             </a:fld>
             <a:endParaRPr lang="en-US" dirty="0"/>
           </a:p>
@@ -4653,7 +4658,7 @@
           <a:p>
             <a:fld id="{48A87A34-81AB-432B-8DAE-1953F412C126}" type="datetimeFigureOut">
               <a:rPr lang="en-US" dirty="0"/>
-              <a:t>4/27/2018</a:t>
+              <a:t>4/28/2018</a:t>
             </a:fld>
             <a:endParaRPr lang="en-US" dirty="0"/>
           </a:p>
@@ -4844,7 +4849,7 @@
           <a:p>
             <a:fld id="{48A87A34-81AB-432B-8DAE-1953F412C126}" type="datetimeFigureOut">
               <a:rPr lang="en-US" dirty="0"/>
-              <a:t>4/27/2018</a:t>
+              <a:t>4/28/2018</a:t>
             </a:fld>
             <a:endParaRPr lang="en-US" dirty="0"/>
           </a:p>
@@ -5102,7 +5107,7 @@
           <a:p>
             <a:fld id="{48A87A34-81AB-432B-8DAE-1953F412C126}" type="datetimeFigureOut">
               <a:rPr lang="en-US" dirty="0"/>
-              <a:t>4/27/2018</a:t>
+              <a:t>4/28/2018</a:t>
             </a:fld>
             <a:endParaRPr lang="en-US" dirty="0"/>
           </a:p>
@@ -5531,7 +5536,7 @@
           <a:p>
             <a:fld id="{48A87A34-81AB-432B-8DAE-1953F412C126}" type="datetimeFigureOut">
               <a:rPr lang="en-US" dirty="0"/>
-              <a:t>4/27/2018</a:t>
+              <a:t>4/28/2018</a:t>
             </a:fld>
             <a:endParaRPr lang="en-US" dirty="0"/>
           </a:p>
@@ -6072,7 +6077,7 @@
           <a:p>
             <a:fld id="{48A87A34-81AB-432B-8DAE-1953F412C126}" type="datetimeFigureOut">
               <a:rPr lang="en-US" dirty="0"/>
-              <a:t>4/27/2018</a:t>
+              <a:t>4/28/2018</a:t>
             </a:fld>
             <a:endParaRPr lang="en-US" dirty="0"/>
           </a:p>
@@ -6787,7 +6792,7 @@
           <a:p>
             <a:fld id="{48A87A34-81AB-432B-8DAE-1953F412C126}" type="datetimeFigureOut">
               <a:rPr lang="en-US" dirty="0"/>
-              <a:t>4/27/2018</a:t>
+              <a:t>4/28/2018</a:t>
             </a:fld>
             <a:endParaRPr lang="en-US" dirty="0"/>
           </a:p>
@@ -6952,7 +6957,7 @@
           <a:p>
             <a:fld id="{48A87A34-81AB-432B-8DAE-1953F412C126}" type="datetimeFigureOut">
               <a:rPr lang="en-US" dirty="0"/>
-              <a:t>4/27/2018</a:t>
+              <a:t>4/28/2018</a:t>
             </a:fld>
             <a:endParaRPr lang="en-US" dirty="0"/>
           </a:p>
@@ -7127,7 +7132,7 @@
           <a:p>
             <a:fld id="{48A87A34-81AB-432B-8DAE-1953F412C126}" type="datetimeFigureOut">
               <a:rPr lang="en-US" dirty="0"/>
-              <a:t>4/27/2018</a:t>
+              <a:t>4/28/2018</a:t>
             </a:fld>
             <a:endParaRPr lang="en-US" dirty="0"/>
           </a:p>
@@ -7292,7 +7297,7 @@
           <a:p>
             <a:fld id="{48A87A34-81AB-432B-8DAE-1953F412C126}" type="datetimeFigureOut">
               <a:rPr lang="en-US" dirty="0"/>
-              <a:t>4/27/2018</a:t>
+              <a:t>4/28/2018</a:t>
             </a:fld>
             <a:endParaRPr lang="en-US" dirty="0"/>
           </a:p>
@@ -7537,7 +7542,7 @@
           <a:p>
             <a:fld id="{48A87A34-81AB-432B-8DAE-1953F412C126}" type="datetimeFigureOut">
               <a:rPr lang="en-US" dirty="0"/>
-              <a:t>4/27/2018</a:t>
+              <a:t>4/28/2018</a:t>
             </a:fld>
             <a:endParaRPr lang="en-US" dirty="0"/>
           </a:p>
@@ -7764,7 +7769,7 @@
           <a:p>
             <a:fld id="{48A87A34-81AB-432B-8DAE-1953F412C126}" type="datetimeFigureOut">
               <a:rPr lang="en-US" dirty="0"/>
-              <a:t>4/27/2018</a:t>
+              <a:t>4/28/2018</a:t>
             </a:fld>
             <a:endParaRPr lang="en-US" dirty="0"/>
           </a:p>
@@ -8140,7 +8145,7 @@
           <a:p>
             <a:fld id="{48A87A34-81AB-432B-8DAE-1953F412C126}" type="datetimeFigureOut">
               <a:rPr lang="en-US" dirty="0"/>
-              <a:t>4/27/2018</a:t>
+              <a:t>4/28/2018</a:t>
             </a:fld>
             <a:endParaRPr lang="en-US" dirty="0"/>
           </a:p>
@@ -8253,7 +8258,7 @@
           <a:p>
             <a:fld id="{48A87A34-81AB-432B-8DAE-1953F412C126}" type="datetimeFigureOut">
               <a:rPr lang="en-US" dirty="0"/>
-              <a:t>4/27/2018</a:t>
+              <a:t>4/28/2018</a:t>
             </a:fld>
             <a:endParaRPr lang="en-US" dirty="0"/>
           </a:p>
@@ -8343,7 +8348,7 @@
           <a:p>
             <a:fld id="{48A87A34-81AB-432B-8DAE-1953F412C126}" type="datetimeFigureOut">
               <a:rPr lang="en-US" dirty="0"/>
-              <a:t>4/27/2018</a:t>
+              <a:t>4/28/2018</a:t>
             </a:fld>
             <a:endParaRPr lang="en-US" dirty="0"/>
           </a:p>
@@ -8587,7 +8592,7 @@
           <a:p>
             <a:fld id="{48A87A34-81AB-432B-8DAE-1953F412C126}" type="datetimeFigureOut">
               <a:rPr lang="en-US" dirty="0"/>
-              <a:t>4/27/2018</a:t>
+              <a:t>4/28/2018</a:t>
             </a:fld>
             <a:endParaRPr lang="en-US" dirty="0"/>
           </a:p>
@@ -8862,7 +8867,7 @@
           <a:p>
             <a:fld id="{48A87A34-81AB-432B-8DAE-1953F412C126}" type="datetimeFigureOut">
               <a:rPr lang="en-US" dirty="0"/>
-              <a:t>4/27/2018</a:t>
+              <a:t>4/28/2018</a:t>
             </a:fld>
             <a:endParaRPr lang="en-US" dirty="0"/>
           </a:p>
@@ -8980,7 +8985,7 @@
           <a:noFill/>
           <a:extLst>
             <a:ext uri="{909E8E84-426E-40dd-AFC4-6F175D3DCCD1}">
-              <a14:hiddenFill xmlns:a14="http://schemas.microsoft.com/office/drawing/2010/main" xmlns="">
+              <a14:hiddenFill xmlns="" xmlns:a14="http://schemas.microsoft.com/office/drawing/2010/main">
                 <a:solidFill>
                   <a:srgbClr val="FFFFFF"/>
                 </a:solidFill>
@@ -9054,7 +9059,7 @@
               </a:ln>
               <a:extLst>
                 <a:ext uri="{91240B29-F687-4f45-9708-019B960494DF}">
-                  <a14:hiddenLine xmlns:a14="http://schemas.microsoft.com/office/drawing/2010/main" xmlns="" w="9525">
+                  <a14:hiddenLine xmlns="" xmlns:a14="http://schemas.microsoft.com/office/drawing/2010/main" w="9525">
                     <a:solidFill>
                       <a:srgbClr val="000000"/>
                     </a:solidFill>
@@ -9144,7 +9149,7 @@
               </a:ln>
               <a:extLst>
                 <a:ext uri="{91240B29-F687-4f45-9708-019B960494DF}">
-                  <a14:hiddenLine xmlns:a14="http://schemas.microsoft.com/office/drawing/2010/main" xmlns="" w="9525">
+                  <a14:hiddenLine xmlns="" xmlns:a14="http://schemas.microsoft.com/office/drawing/2010/main" w="9525">
                     <a:solidFill>
                       <a:srgbClr val="000000"/>
                     </a:solidFill>
@@ -9234,7 +9239,7 @@
               </a:ln>
               <a:extLst>
                 <a:ext uri="{91240B29-F687-4f45-9708-019B960494DF}">
-                  <a14:hiddenLine xmlns:a14="http://schemas.microsoft.com/office/drawing/2010/main" xmlns="" w="9525">
+                  <a14:hiddenLine xmlns="" xmlns:a14="http://schemas.microsoft.com/office/drawing/2010/main" w="9525">
                     <a:solidFill>
                       <a:srgbClr val="000000"/>
                     </a:solidFill>
@@ -9296,7 +9301,7 @@
               </a:ln>
               <a:extLst>
                 <a:ext uri="{91240B29-F687-4f45-9708-019B960494DF}">
-                  <a14:hiddenLine xmlns:a14="http://schemas.microsoft.com/office/drawing/2010/main" xmlns="" w="9525">
+                  <a14:hiddenLine xmlns="" xmlns:a14="http://schemas.microsoft.com/office/drawing/2010/main" w="9525">
                     <a:solidFill>
                       <a:srgbClr val="000000"/>
                     </a:solidFill>
@@ -9386,7 +9391,7 @@
               </a:ln>
               <a:extLst>
                 <a:ext uri="{91240B29-F687-4f45-9708-019B960494DF}">
-                  <a14:hiddenLine xmlns:a14="http://schemas.microsoft.com/office/drawing/2010/main" xmlns="" w="9525">
+                  <a14:hiddenLine xmlns="" xmlns:a14="http://schemas.microsoft.com/office/drawing/2010/main" w="9525">
                     <a:solidFill>
                       <a:srgbClr val="000000"/>
                     </a:solidFill>
@@ -9448,7 +9453,7 @@
               </a:ln>
               <a:extLst>
                 <a:ext uri="{91240B29-F687-4f45-9708-019B960494DF}">
-                  <a14:hiddenLine xmlns:a14="http://schemas.microsoft.com/office/drawing/2010/main" xmlns="" w="9525">
+                  <a14:hiddenLine xmlns="" xmlns:a14="http://schemas.microsoft.com/office/drawing/2010/main" w="9525">
                     <a:solidFill>
                       <a:srgbClr val="000000"/>
                     </a:solidFill>
@@ -9510,7 +9515,7 @@
               </a:ln>
               <a:extLst>
                 <a:ext uri="{91240B29-F687-4f45-9708-019B960494DF}">
-                  <a14:hiddenLine xmlns:a14="http://schemas.microsoft.com/office/drawing/2010/main" xmlns="" w="9525">
+                  <a14:hiddenLine xmlns="" xmlns:a14="http://schemas.microsoft.com/office/drawing/2010/main" w="9525">
                     <a:solidFill>
                       <a:srgbClr val="000000"/>
                     </a:solidFill>
@@ -9600,7 +9605,7 @@
               </a:ln>
               <a:extLst>
                 <a:ext uri="{91240B29-F687-4f45-9708-019B960494DF}">
-                  <a14:hiddenLine xmlns:a14="http://schemas.microsoft.com/office/drawing/2010/main" xmlns="" w="9525">
+                  <a14:hiddenLine xmlns="" xmlns:a14="http://schemas.microsoft.com/office/drawing/2010/main" w="9525">
                     <a:solidFill>
                       <a:srgbClr val="000000"/>
                     </a:solidFill>
@@ -9690,7 +9695,7 @@
               </a:ln>
               <a:extLst>
                 <a:ext uri="{91240B29-F687-4f45-9708-019B960494DF}">
-                  <a14:hiddenLine xmlns:a14="http://schemas.microsoft.com/office/drawing/2010/main" xmlns="" w="9525">
+                  <a14:hiddenLine xmlns="" xmlns:a14="http://schemas.microsoft.com/office/drawing/2010/main" w="9525">
                     <a:solidFill>
                       <a:srgbClr val="000000"/>
                     </a:solidFill>
@@ -9752,7 +9757,7 @@
               </a:ln>
               <a:extLst>
                 <a:ext uri="{91240B29-F687-4f45-9708-019B960494DF}">
-                  <a14:hiddenLine xmlns:a14="http://schemas.microsoft.com/office/drawing/2010/main" xmlns="" w="9525">
+                  <a14:hiddenLine xmlns="" xmlns:a14="http://schemas.microsoft.com/office/drawing/2010/main" w="9525">
                     <a:solidFill>
                       <a:srgbClr val="000000"/>
                     </a:solidFill>
@@ -9862,7 +9867,7 @@
               </a:ln>
               <a:extLst>
                 <a:ext uri="{91240B29-F687-4f45-9708-019B960494DF}">
-                  <a14:hiddenLine xmlns:a14="http://schemas.microsoft.com/office/drawing/2010/main" xmlns="" w="9525">
+                  <a14:hiddenLine xmlns="" xmlns:a14="http://schemas.microsoft.com/office/drawing/2010/main" w="9525">
                     <a:solidFill>
                       <a:srgbClr val="000000"/>
                     </a:solidFill>
@@ -9946,7 +9951,7 @@
               </a:ln>
               <a:extLst>
                 <a:ext uri="{91240B29-F687-4f45-9708-019B960494DF}">
-                  <a14:hiddenLine xmlns:a14="http://schemas.microsoft.com/office/drawing/2010/main" xmlns="" w="9525">
+                  <a14:hiddenLine xmlns="" xmlns:a14="http://schemas.microsoft.com/office/drawing/2010/main" w="9525">
                     <a:solidFill>
                       <a:srgbClr val="000000"/>
                     </a:solidFill>
@@ -10008,7 +10013,7 @@
               </a:ln>
               <a:extLst>
                 <a:ext uri="{91240B29-F687-4f45-9708-019B960494DF}">
-                  <a14:hiddenLine xmlns:a14="http://schemas.microsoft.com/office/drawing/2010/main" xmlns="" w="9525">
+                  <a14:hiddenLine xmlns="" xmlns:a14="http://schemas.microsoft.com/office/drawing/2010/main" w="9525">
                     <a:solidFill>
                       <a:srgbClr val="000000"/>
                     </a:solidFill>
@@ -10070,7 +10075,7 @@
               </a:ln>
               <a:extLst>
                 <a:ext uri="{91240B29-F687-4f45-9708-019B960494DF}">
-                  <a14:hiddenLine xmlns:a14="http://schemas.microsoft.com/office/drawing/2010/main" xmlns="" w="9525">
+                  <a14:hiddenLine xmlns="" xmlns:a14="http://schemas.microsoft.com/office/drawing/2010/main" w="9525">
                     <a:solidFill>
                       <a:srgbClr val="000000"/>
                     </a:solidFill>
@@ -10160,7 +10165,7 @@
               </a:ln>
               <a:extLst>
                 <a:ext uri="{91240B29-F687-4f45-9708-019B960494DF}">
-                  <a14:hiddenLine xmlns:a14="http://schemas.microsoft.com/office/drawing/2010/main" xmlns="" w="9525">
+                  <a14:hiddenLine xmlns="" xmlns:a14="http://schemas.microsoft.com/office/drawing/2010/main" w="9525">
                     <a:solidFill>
                       <a:srgbClr val="000000"/>
                     </a:solidFill>
@@ -10194,7 +10199,7 @@
               </a:ln>
               <a:extLst>
                 <a:ext uri="{91240B29-F687-4f45-9708-019B960494DF}">
-                  <a14:hiddenLine xmlns:a14="http://schemas.microsoft.com/office/drawing/2010/main" xmlns="" w="9525">
+                  <a14:hiddenLine xmlns="" xmlns:a14="http://schemas.microsoft.com/office/drawing/2010/main" w="9525">
                     <a:solidFill>
                       <a:srgbClr val="000000"/>
                     </a:solidFill>
@@ -10259,7 +10264,7 @@
               </a:ln>
               <a:extLst>
                 <a:ext uri="{91240B29-F687-4f45-9708-019B960494DF}">
-                  <a14:hiddenLine xmlns:a14="http://schemas.microsoft.com/office/drawing/2010/main" xmlns="" w="9525">
+                  <a14:hiddenLine xmlns="" xmlns:a14="http://schemas.microsoft.com/office/drawing/2010/main" w="9525">
                     <a:solidFill>
                       <a:srgbClr val="000000"/>
                     </a:solidFill>
@@ -10349,7 +10354,7 @@
               </a:ln>
               <a:extLst>
                 <a:ext uri="{91240B29-F687-4f45-9708-019B960494DF}">
-                  <a14:hiddenLine xmlns:a14="http://schemas.microsoft.com/office/drawing/2010/main" xmlns="" w="9525">
+                  <a14:hiddenLine xmlns="" xmlns:a14="http://schemas.microsoft.com/office/drawing/2010/main" w="9525">
                     <a:solidFill>
                       <a:srgbClr val="000000"/>
                     </a:solidFill>
@@ -10411,7 +10416,7 @@
               </a:ln>
               <a:extLst>
                 <a:ext uri="{91240B29-F687-4f45-9708-019B960494DF}">
-                  <a14:hiddenLine xmlns:a14="http://schemas.microsoft.com/office/drawing/2010/main" xmlns="" w="9525">
+                  <a14:hiddenLine xmlns="" xmlns:a14="http://schemas.microsoft.com/office/drawing/2010/main" w="9525">
                     <a:solidFill>
                       <a:srgbClr val="000000"/>
                     </a:solidFill>
@@ -10501,7 +10506,7 @@
               </a:ln>
               <a:extLst>
                 <a:ext uri="{91240B29-F687-4f45-9708-019B960494DF}">
-                  <a14:hiddenLine xmlns:a14="http://schemas.microsoft.com/office/drawing/2010/main" xmlns="" w="9525">
+                  <a14:hiddenLine xmlns="" xmlns:a14="http://schemas.microsoft.com/office/drawing/2010/main" w="9525">
                     <a:solidFill>
                       <a:srgbClr val="000000"/>
                     </a:solidFill>
@@ -10566,7 +10571,7 @@
               </a:ln>
               <a:extLst>
                 <a:ext uri="{91240B29-F687-4f45-9708-019B960494DF}">
-                  <a14:hiddenLine xmlns:a14="http://schemas.microsoft.com/office/drawing/2010/main" xmlns="" w="9525">
+                  <a14:hiddenLine xmlns="" xmlns:a14="http://schemas.microsoft.com/office/drawing/2010/main" w="9525">
                     <a:solidFill>
                       <a:srgbClr val="000000"/>
                     </a:solidFill>
@@ -10628,7 +10633,7 @@
               </a:ln>
               <a:extLst>
                 <a:ext uri="{91240B29-F687-4f45-9708-019B960494DF}">
-                  <a14:hiddenLine xmlns:a14="http://schemas.microsoft.com/office/drawing/2010/main" xmlns="" w="9525">
+                  <a14:hiddenLine xmlns="" xmlns:a14="http://schemas.microsoft.com/office/drawing/2010/main" w="9525">
                     <a:solidFill>
                       <a:srgbClr val="000000"/>
                     </a:solidFill>
@@ -10718,7 +10723,7 @@
               </a:ln>
               <a:extLst>
                 <a:ext uri="{91240B29-F687-4f45-9708-019B960494DF}">
-                  <a14:hiddenLine xmlns:a14="http://schemas.microsoft.com/office/drawing/2010/main" xmlns="" w="9525">
+                  <a14:hiddenLine xmlns="" xmlns:a14="http://schemas.microsoft.com/office/drawing/2010/main" w="9525">
                     <a:solidFill>
                       <a:srgbClr val="000000"/>
                     </a:solidFill>
@@ -10808,7 +10813,7 @@
               </a:ln>
               <a:extLst>
                 <a:ext uri="{91240B29-F687-4f45-9708-019B960494DF}">
-                  <a14:hiddenLine xmlns:a14="http://schemas.microsoft.com/office/drawing/2010/main" xmlns="" w="9525">
+                  <a14:hiddenLine xmlns="" xmlns:a14="http://schemas.microsoft.com/office/drawing/2010/main" w="9525">
                     <a:solidFill>
                       <a:srgbClr val="000000"/>
                     </a:solidFill>
@@ -10873,7 +10878,7 @@
               </a:ln>
               <a:extLst>
                 <a:ext uri="{91240B29-F687-4f45-9708-019B960494DF}">
-                  <a14:hiddenLine xmlns:a14="http://schemas.microsoft.com/office/drawing/2010/main" xmlns="" w="9525">
+                  <a14:hiddenLine xmlns="" xmlns:a14="http://schemas.microsoft.com/office/drawing/2010/main" w="9525">
                     <a:solidFill>
                       <a:srgbClr val="000000"/>
                     </a:solidFill>
@@ -10993,7 +10998,7 @@
               </a:ln>
               <a:extLst>
                 <a:ext uri="{91240B29-F687-4f45-9708-019B960494DF}">
-                  <a14:hiddenLine xmlns:a14="http://schemas.microsoft.com/office/drawing/2010/main" xmlns="" w="9525">
+                  <a14:hiddenLine xmlns="" xmlns:a14="http://schemas.microsoft.com/office/drawing/2010/main" w="9525">
                     <a:solidFill>
                       <a:srgbClr val="000000"/>
                     </a:solidFill>
@@ -11074,7 +11079,7 @@
               </a:ln>
               <a:extLst>
                 <a:ext uri="{91240B29-F687-4f45-9708-019B960494DF}">
-                  <a14:hiddenLine xmlns:a14="http://schemas.microsoft.com/office/drawing/2010/main" xmlns="" w="9525">
+                  <a14:hiddenLine xmlns="" xmlns:a14="http://schemas.microsoft.com/office/drawing/2010/main" w="9525">
                     <a:solidFill>
                       <a:srgbClr val="000000"/>
                     </a:solidFill>
@@ -11189,7 +11194,7 @@
               </a:ln>
               <a:extLst>
                 <a:ext uri="{91240B29-F687-4f45-9708-019B960494DF}">
-                  <a14:hiddenLine xmlns:a14="http://schemas.microsoft.com/office/drawing/2010/main" xmlns="" w="9525">
+                  <a14:hiddenLine xmlns="" xmlns:a14="http://schemas.microsoft.com/office/drawing/2010/main" w="9525">
                     <a:solidFill>
                       <a:srgbClr val="000000"/>
                     </a:solidFill>
@@ -11279,7 +11284,7 @@
               </a:ln>
               <a:extLst>
                 <a:ext uri="{91240B29-F687-4f45-9708-019B960494DF}">
-                  <a14:hiddenLine xmlns:a14="http://schemas.microsoft.com/office/drawing/2010/main" xmlns="" w="9525">
+                  <a14:hiddenLine xmlns="" xmlns:a14="http://schemas.microsoft.com/office/drawing/2010/main" w="9525">
                     <a:solidFill>
                       <a:srgbClr val="000000"/>
                     </a:solidFill>
@@ -11344,7 +11349,7 @@
               </a:ln>
               <a:extLst>
                 <a:ext uri="{91240B29-F687-4f45-9708-019B960494DF}">
-                  <a14:hiddenLine xmlns:a14="http://schemas.microsoft.com/office/drawing/2010/main" xmlns="" w="9525">
+                  <a14:hiddenLine xmlns="" xmlns:a14="http://schemas.microsoft.com/office/drawing/2010/main" w="9525">
                     <a:solidFill>
                       <a:srgbClr val="000000"/>
                     </a:solidFill>
@@ -11434,7 +11439,7 @@
               </a:ln>
               <a:extLst>
                 <a:ext uri="{91240B29-F687-4f45-9708-019B960494DF}">
-                  <a14:hiddenLine xmlns:a14="http://schemas.microsoft.com/office/drawing/2010/main" xmlns="" w="9525">
+                  <a14:hiddenLine xmlns="" xmlns:a14="http://schemas.microsoft.com/office/drawing/2010/main" w="9525">
                     <a:solidFill>
                       <a:srgbClr val="000000"/>
                     </a:solidFill>
@@ -11502,7 +11507,7 @@
               </a:ln>
               <a:extLst>
                 <a:ext uri="{91240B29-F687-4f45-9708-019B960494DF}">
-                  <a14:hiddenLine xmlns:a14="http://schemas.microsoft.com/office/drawing/2010/main" xmlns="" w="9525">
+                  <a14:hiddenLine xmlns="" xmlns:a14="http://schemas.microsoft.com/office/drawing/2010/main" w="9525">
                     <a:solidFill>
                       <a:srgbClr val="000000"/>
                     </a:solidFill>
@@ -11592,7 +11597,7 @@
               </a:ln>
               <a:extLst>
                 <a:ext uri="{91240B29-F687-4f45-9708-019B960494DF}">
-                  <a14:hiddenLine xmlns:a14="http://schemas.microsoft.com/office/drawing/2010/main" xmlns="" w="9525">
+                  <a14:hiddenLine xmlns="" xmlns:a14="http://schemas.microsoft.com/office/drawing/2010/main" w="9525">
                     <a:solidFill>
                       <a:srgbClr val="000000"/>
                     </a:solidFill>
@@ -11660,7 +11665,7 @@
               </a:ln>
               <a:extLst>
                 <a:ext uri="{91240B29-F687-4f45-9708-019B960494DF}">
-                  <a14:hiddenLine xmlns:a14="http://schemas.microsoft.com/office/drawing/2010/main" xmlns="" w="9525">
+                  <a14:hiddenLine xmlns="" xmlns:a14="http://schemas.microsoft.com/office/drawing/2010/main" w="9525">
                     <a:solidFill>
                       <a:srgbClr val="000000"/>
                     </a:solidFill>
@@ -11750,7 +11755,7 @@
               </a:ln>
               <a:extLst>
                 <a:ext uri="{91240B29-F687-4f45-9708-019B960494DF}">
-                  <a14:hiddenLine xmlns:a14="http://schemas.microsoft.com/office/drawing/2010/main" xmlns="" w="9525">
+                  <a14:hiddenLine xmlns="" xmlns:a14="http://schemas.microsoft.com/office/drawing/2010/main" w="9525">
                     <a:solidFill>
                       <a:srgbClr val="000000"/>
                     </a:solidFill>
@@ -11784,7 +11789,7 @@
               </a:ln>
               <a:extLst>
                 <a:ext uri="{91240B29-F687-4f45-9708-019B960494DF}">
-                  <a14:hiddenLine xmlns:a14="http://schemas.microsoft.com/office/drawing/2010/main" xmlns="" w="9525">
+                  <a14:hiddenLine xmlns="" xmlns:a14="http://schemas.microsoft.com/office/drawing/2010/main" w="9525">
                     <a:solidFill>
                       <a:srgbClr val="000000"/>
                     </a:solidFill>
@@ -11925,7 +11930,7 @@
             <a:fld id="{48A87A34-81AB-432B-8DAE-1953F412C126}" type="datetimeFigureOut">
               <a:rPr lang="en-US" dirty="0"/>
               <a:pPr/>
-              <a:t>4/27/2018</a:t>
+              <a:t>4/28/2018</a:t>
             </a:fld>
             <a:endParaRPr lang="en-US" dirty="0"/>
           </a:p>
@@ -12475,14 +12480,13 @@
           <a:p>
             <a:r>
               <a:rPr lang="en-US" dirty="0"/>
-              <a:t>Show all 5k, 10k, and half marathons within the Denver, CO area. </a:t>
+              <a:t>Show all 5k, 10k, and half marathons within the Denver, CO </a:t>
             </a:r>
-          </a:p>
-          <a:p>
             <a:r>
-              <a:rPr lang="en-US" dirty="0"/>
-              <a:t>Users who create an account will be able to post ads for running buddies for a specific race.</a:t>
+              <a:rPr lang="en-US"/>
+              <a:t>area.</a:t>
             </a:r>
+            <a:endParaRPr lang="en-US" dirty="0"/>
           </a:p>
         </p:txBody>
       </p:sp>

</xml_diff>